<commit_message>
Overwrite Default Validation Texts
</commit_message>
<xml_diff>
--- a/.lessons/14 Form validation and Handling/4 More Validation Rules/More Validation Rules.pptx
+++ b/.lessons/14 Form validation and Handling/4 More Validation Rules/More Validation Rules.pptx
@@ -3350,7 +3350,7 @@
         <p:spPr>
           <a:xfrm>
             <a:off x="217714" y="255046"/>
-            <a:ext cx="11756571" cy="3263842"/>
+            <a:ext cx="11756571" cy="2314544"/>
           </a:xfrm>
           <a:prstGeom prst="rect">
             <a:avLst/>
@@ -3465,69 +3465,6 @@
             <a:endParaRPr lang="az-Latn-AZ" altLang="en-US" sz="1400">
               <a:latin typeface="Arial" panose="020B0604020202020204" pitchFamily="34" charset="0"/>
             </a:endParaRPr>
-          </a:p>
-          <a:p>
-            <a:pPr>
-              <a:lnSpc>
-                <a:spcPct val="150000"/>
-              </a:lnSpc>
-              <a:buNone/>
-            </a:pPr>
-            <a:endParaRPr kumimoji="0" lang="az-Latn-AZ" altLang="en-US" sz="1400" b="0" i="0" u="none" strike="noStrike" cap="none" normalizeH="0" baseline="0">
-              <a:ln>
-                <a:noFill/>
-              </a:ln>
-              <a:solidFill>
-                <a:schemeClr val="tx1"/>
-              </a:solidFill>
-              <a:effectLst/>
-              <a:latin typeface="Arial" panose="020B0604020202020204" pitchFamily="34" charset="0"/>
-            </a:endParaRPr>
-          </a:p>
-          <a:p>
-            <a:pPr>
-              <a:lnSpc>
-                <a:spcPct val="150000"/>
-              </a:lnSpc>
-              <a:buNone/>
-            </a:pPr>
-            <a:endParaRPr lang="az-Latn-AZ" altLang="en-US" sz="1400">
-              <a:latin typeface="Arial" panose="020B0604020202020204" pitchFamily="34" charset="0"/>
-            </a:endParaRPr>
-          </a:p>
-          <a:p>
-            <a:pPr>
-              <a:lnSpc>
-                <a:spcPct val="150000"/>
-              </a:lnSpc>
-              <a:buNone/>
-            </a:pPr>
-            <a:r>
-              <a:rPr kumimoji="0" lang="en-US" altLang="en-US" sz="1300" b="1" i="0" u="none" strike="noStrike" cap="none" normalizeH="0" baseline="0">
-                <a:ln>
-                  <a:noFill/>
-                </a:ln>
-                <a:solidFill>
-                  <a:schemeClr val="tx1"/>
-                </a:solidFill>
-                <a:effectLst/>
-                <a:latin typeface="Arial" panose="020B0604020202020204" pitchFamily="34" charset="0"/>
-              </a:rPr>
-              <a:t>Bonus</a:t>
-            </a:r>
-            <a:r>
-              <a:rPr kumimoji="0" lang="en-US" altLang="en-US" sz="1300" b="0" i="0" u="none" strike="noStrike" cap="none" normalizeH="0" baseline="0">
-                <a:ln>
-                  <a:noFill/>
-                </a:ln>
-                <a:solidFill>
-                  <a:schemeClr val="tx1"/>
-                </a:solidFill>
-                <a:effectLst/>
-                <a:latin typeface="Arial" panose="020B0604020202020204" pitchFamily="34" charset="0"/>
-              </a:rPr>
-              <a:t>: Səhv mesajlarını fərdiləşdirmək</a:t>
-            </a:r>
           </a:p>
         </p:txBody>
       </p:sp>
@@ -3555,36 +3492,6 @@
           <a:xfrm>
             <a:off x="217714" y="852781"/>
             <a:ext cx="5315692" cy="1419423"/>
-          </a:xfrm>
-          <a:prstGeom prst="rect">
-            <a:avLst/>
-          </a:prstGeom>
-        </p:spPr>
-      </p:pic>
-      <p:pic>
-        <p:nvPicPr>
-          <p:cNvPr id="6" name="Picture 5">
-            <a:extLst>
-              <a:ext uri="{FF2B5EF4-FFF2-40B4-BE49-F238E27FC236}">
-                <a16:creationId xmlns:a16="http://schemas.microsoft.com/office/drawing/2014/main" id="{634B9E7D-2A05-E88A-2CB2-119079A8873C}"/>
-              </a:ext>
-            </a:extLst>
-          </p:cNvPr>
-          <p:cNvPicPr>
-            <a:picLocks noChangeAspect="1"/>
-          </p:cNvPicPr>
-          <p:nvPr/>
-        </p:nvPicPr>
-        <p:blipFill>
-          <a:blip r:embed="rId3"/>
-          <a:stretch>
-            <a:fillRect/>
-          </a:stretch>
-        </p:blipFill>
-        <p:spPr>
-          <a:xfrm>
-            <a:off x="217714" y="3722383"/>
-            <a:ext cx="8973802" cy="2486372"/>
           </a:xfrm>
           <a:prstGeom prst="rect">
             <a:avLst/>

</xml_diff>